<commit_message>
added hop on hasconutry and latex
</commit_message>
<xml_diff>
--- a/proposals/presentation.pptx
+++ b/proposals/presentation.pptx
@@ -12056,10 +12056,10 @@
               <a:buNone/>
             </a:pPr>
             <a:r>
-              <a:rPr lang="en-GB"/>
+              <a:rPr lang="en-GB" dirty="0"/>
               <a:t>VGCHARTZ</a:t>
             </a:r>
-            <a:endParaRPr/>
+            <a:endParaRPr dirty="0"/>
           </a:p>
         </p:txBody>
       </p:sp>
@@ -12301,10 +12301,10 @@
                         <a:buNone/>
                       </a:pPr>
                       <a:r>
-                        <a:rPr lang="en-GB" sz="1300"/>
+                        <a:rPr lang="en-GB" sz="1300" dirty="0"/>
                         <a:t>id</a:t>
                       </a:r>
-                      <a:endParaRPr sz="1300"/>
+                      <a:endParaRPr sz="1300" dirty="0"/>
                     </a:p>
                   </a:txBody>
                   <a:tcPr marL="91425" marR="91425" marT="91425" marB="91425"/>
@@ -12370,10 +12370,10 @@
                         <a:buNone/>
                       </a:pPr>
                       <a:r>
-                        <a:rPr lang="en-GB" sz="1300"/>
+                        <a:rPr lang="en-GB" sz="1300" dirty="0"/>
                         <a:t>publisher</a:t>
                       </a:r>
-                      <a:endParaRPr sz="1300"/>
+                      <a:endParaRPr sz="1300" dirty="0"/>
                     </a:p>
                   </a:txBody>
                   <a:tcPr marL="91425" marR="91425" marT="91425" marB="91425"/>
@@ -12485,10 +12485,10 @@
                         <a:buNone/>
                       </a:pPr>
                       <a:r>
-                        <a:rPr lang="en-GB" sz="1300"/>
+                        <a:rPr lang="en-GB" sz="1300" dirty="0"/>
                         <a:t>releaseDate</a:t>
                       </a:r>
-                      <a:endParaRPr sz="1300"/>
+                      <a:endParaRPr sz="1300" dirty="0"/>
                     </a:p>
                   </a:txBody>
                   <a:tcPr marL="91425" marR="91425" marT="91425" marB="91425"/>
@@ -12699,10 +12699,14 @@
               <a:buNone/>
             </a:pPr>
             <a:r>
-              <a:rPr lang="en-GB" b="1"/>
-              <a:t>Gamedev (csv)</a:t>
-            </a:r>
-            <a:endParaRPr b="1"/>
+              <a:rPr lang="en-GB" b="1" dirty="0" err="1"/>
+              <a:t>Gamedev</a:t>
+            </a:r>
+            <a:r>
+              <a:rPr lang="en-GB" b="1" dirty="0"/>
+              <a:t> (csv)</a:t>
+            </a:r>
+            <a:endParaRPr b="1" dirty="0"/>
           </a:p>
           <a:p>
             <a:pPr marL="0" lvl="0" indent="0" algn="l" rtl="0">
@@ -12714,7 +12718,7 @@
               </a:spcAft>
               <a:buNone/>
             </a:pPr>
-            <a:endParaRPr b="1"/>
+            <a:endParaRPr b="1" dirty="0"/>
           </a:p>
           <a:p>
             <a:pPr marL="0" lvl="0" indent="0" algn="l" rtl="0">
@@ -12727,10 +12731,10 @@
               <a:buNone/>
             </a:pPr>
             <a:r>
-              <a:rPr lang="en-GB" sz="1600"/>
+              <a:rPr lang="en-GB" sz="1600" dirty="0"/>
               <a:t>Contains geographic-related information about videogame developing and publishing companies.</a:t>
             </a:r>
-            <a:endParaRPr sz="1600"/>
+            <a:endParaRPr sz="1600" dirty="0"/>
           </a:p>
           <a:p>
             <a:pPr marL="0" lvl="0" indent="0" algn="l" rtl="0">
@@ -12743,10 +12747,10 @@
               <a:buNone/>
             </a:pPr>
             <a:r>
-              <a:rPr lang="en-GB" sz="1600"/>
+              <a:rPr lang="en-GB" sz="1600" dirty="0"/>
               <a:t>This dataset will be a crucial utility in the design of geographic and market related tasks.</a:t>
             </a:r>
-            <a:endParaRPr sz="1600"/>
+            <a:endParaRPr sz="1600" dirty="0"/>
           </a:p>
           <a:p>
             <a:pPr marL="0" lvl="0" indent="0" algn="l" rtl="0">
@@ -12759,10 +12763,10 @@
               <a:buNone/>
             </a:pPr>
             <a:r>
-              <a:rPr lang="en-GB" sz="1600"/>
+              <a:rPr lang="en-GB" sz="1600" dirty="0"/>
               <a:t>Token from https://www.gamedevmap.com/</a:t>
             </a:r>
-            <a:endParaRPr sz="1600"/>
+            <a:endParaRPr sz="1600" dirty="0"/>
           </a:p>
           <a:p>
             <a:pPr marL="0" lvl="0" indent="0" algn="l" rtl="0">
@@ -12774,7 +12778,7 @@
               </a:spcAft>
               <a:buNone/>
             </a:pPr>
-            <a:endParaRPr/>
+            <a:endParaRPr dirty="0"/>
           </a:p>
         </p:txBody>
       </p:sp>
@@ -30139,10 +30143,10 @@
               <a:buNone/>
             </a:pPr>
             <a:r>
-              <a:rPr lang="en-GB"/>
+              <a:rPr lang="en-GB" dirty="0"/>
               <a:t>The following datasets were taken from Kaggle:</a:t>
             </a:r>
-            <a:endParaRPr/>
+            <a:endParaRPr dirty="0"/>
           </a:p>
           <a:p>
             <a:pPr marL="0" lvl="0" indent="0" algn="l" rtl="0">
@@ -30155,10 +30159,13 @@
               <a:buNone/>
             </a:pPr>
             <a:r>
-              <a:rPr lang="en-GB" b="1"/>
-              <a:t>GeneralEsportData (csv)</a:t>
-            </a:r>
-            <a:endParaRPr b="1"/>
+              <a:rPr lang="en-GB" b="1" dirty="0" err="1"/>
+              <a:t>GeneralEsportData</a:t>
+            </a:r>
+            <a:r>
+              <a:rPr lang="en-GB" b="1" dirty="0"/>
+              <a:t> (csv)</a:t>
+            </a:r>
           </a:p>
           <a:p>
             <a:pPr marL="0" lvl="0" indent="0" algn="l" rtl="0">
@@ -30171,13 +30178,13 @@
               <a:buNone/>
             </a:pPr>
             <a:br>
-              <a:rPr lang="en-GB" b="1"/>
+              <a:rPr lang="en-GB" b="1" dirty="0"/>
             </a:br>
             <a:r>
-              <a:rPr lang="en-GB" sz="1600"/>
+              <a:rPr lang="en-GB" sz="1600" dirty="0"/>
               <a:t>Provides general information about games and related earnings and tournaments.</a:t>
             </a:r>
-            <a:endParaRPr sz="1600"/>
+            <a:endParaRPr sz="1600" dirty="0"/>
           </a:p>
           <a:p>
             <a:pPr marL="0" lvl="0" indent="0" algn="l" rtl="0">
@@ -30189,7 +30196,7 @@
               </a:spcAft>
               <a:buNone/>
             </a:pPr>
-            <a:endParaRPr b="1"/>
+            <a:endParaRPr b="1" dirty="0"/>
           </a:p>
         </p:txBody>
       </p:sp>
@@ -30197,10 +30204,16 @@
         <p:nvGraphicFramePr>
           <p:cNvPr id="69" name="Google Shape;69;p15"/>
           <p:cNvGraphicFramePr/>
-          <p:nvPr/>
+          <p:nvPr>
+            <p:extLst>
+              <p:ext uri="{D42A27DB-BD31-4B8C-83A1-F6EECF244321}">
+                <p14:modId xmlns:p14="http://schemas.microsoft.com/office/powerpoint/2010/main" val="4034242533"/>
+              </p:ext>
+            </p:extLst>
+          </p:nvPr>
         </p:nvGraphicFramePr>
         <p:xfrm>
-          <a:off x="469350" y="2007200"/>
+          <a:off x="1276594" y="107288"/>
           <a:ext cx="7253375" cy="363075"/>
         </p:xfrm>
         <a:graphic>
@@ -30300,10 +30313,10 @@
                         <a:buNone/>
                       </a:pPr>
                       <a:r>
-                        <a:rPr lang="en-GB" sz="1000"/>
+                        <a:rPr lang="en-GB" sz="1000" dirty="0"/>
                         <a:t>ReleaseDate</a:t>
                       </a:r>
-                      <a:endParaRPr sz="1000"/>
+                      <a:endParaRPr sz="1000" dirty="0"/>
                     </a:p>
                   </a:txBody>
                   <a:tcPr marL="91425" marR="91425" marT="91425" marB="91425"/>
@@ -30369,10 +30382,10 @@
                         <a:buNone/>
                       </a:pPr>
                       <a:r>
-                        <a:rPr lang="en-GB" sz="1000"/>
+                        <a:rPr lang="en-GB" sz="1000" dirty="0"/>
                         <a:t>OnlineEarnings</a:t>
                       </a:r>
-                      <a:endParaRPr sz="1000"/>
+                      <a:endParaRPr sz="1000" dirty="0"/>
                     </a:p>
                   </a:txBody>
                   <a:tcPr marL="91425" marR="91425" marT="91425" marB="91425"/>
@@ -30415,10 +30428,10 @@
                         <a:buNone/>
                       </a:pPr>
                       <a:r>
-                        <a:rPr lang="en-GB" sz="1000"/>
+                        <a:rPr lang="en-GB" sz="1000" dirty="0"/>
                         <a:t>TotalTournaments</a:t>
                       </a:r>
-                      <a:endParaRPr sz="1000"/>
+                      <a:endParaRPr sz="1000" dirty="0"/>
                     </a:p>
                   </a:txBody>
                   <a:tcPr marL="91425" marR="91425" marT="91425" marB="91425"/>
@@ -30660,8 +30673,8 @@
           </a:p>
         </p:txBody>
       </p:sp>
-      <mc:AlternateContent xmlns:mc="http://schemas.openxmlformats.org/markup-compatibility/2006">
-        <mc:Choice xmlns:a14="http://schemas.microsoft.com/office/drawing/2010/main" Requires="a14">
+      <mc:AlternateContent xmlns:mc="http://schemas.openxmlformats.org/markup-compatibility/2006" xmlns:a14="http://schemas.microsoft.com/office/drawing/2010/main">
+        <mc:Choice Requires="a14">
           <p:sp>
             <p:nvSpPr>
               <p:cNvPr id="3" name="Text Placeholder 2">
@@ -31517,7 +31530,7 @@
             </p:txBody>
           </p:sp>
         </mc:Choice>
-        <mc:Fallback>
+        <mc:Fallback xmlns="">
           <p:sp>
             <p:nvSpPr>
               <p:cNvPr id="3" name="Text Placeholder 2">
@@ -31848,10 +31861,10 @@
               <a:buNone/>
             </a:pPr>
             <a:r>
-              <a:rPr lang="en-GB"/>
+              <a:rPr lang="en-GB" dirty="0"/>
               <a:t>The following datasets were taken from Kaggle:</a:t>
             </a:r>
-            <a:endParaRPr/>
+            <a:endParaRPr dirty="0"/>
           </a:p>
           <a:p>
             <a:pPr marL="0" lvl="0" indent="0" algn="l" rtl="0">
@@ -31864,10 +31877,14 @@
               <a:buNone/>
             </a:pPr>
             <a:r>
-              <a:rPr lang="en-GB" b="1"/>
-              <a:t>HistoricalEsportData (csv)</a:t>
-            </a:r>
-            <a:endParaRPr b="1"/>
+              <a:rPr lang="en-GB" b="1" dirty="0" err="1"/>
+              <a:t>HistoricalEsportData</a:t>
+            </a:r>
+            <a:r>
+              <a:rPr lang="en-GB" b="1" dirty="0"/>
+              <a:t> (csv)</a:t>
+            </a:r>
+            <a:endParaRPr b="1" dirty="0"/>
           </a:p>
           <a:p>
             <a:pPr marL="0" lvl="0" indent="0" algn="l" rtl="0">
@@ -31880,20 +31897,20 @@
               <a:buNone/>
             </a:pPr>
             <a:br>
-              <a:rPr lang="en-GB" sz="1600"/>
+              <a:rPr lang="en-GB" sz="1600" dirty="0"/>
             </a:br>
             <a:r>
-              <a:rPr lang="en-GB" sz="1600"/>
+              <a:rPr lang="en-GB" sz="1600" dirty="0"/>
               <a:t>Provides general information about games form an historical perspective. </a:t>
             </a:r>
             <a:br>
-              <a:rPr lang="en-GB" sz="1600"/>
+              <a:rPr lang="en-GB" sz="1600" dirty="0"/>
             </a:br>
             <a:r>
-              <a:rPr lang="en-GB" sz="1600"/>
+              <a:rPr lang="en-GB" sz="1600" dirty="0"/>
               <a:t>(Tuples are sorted by Date).</a:t>
             </a:r>
-            <a:endParaRPr b="1"/>
+            <a:endParaRPr b="1" dirty="0"/>
           </a:p>
           <a:p>
             <a:pPr marL="0" lvl="0" indent="0" algn="l" rtl="0">
@@ -31905,7 +31922,7 @@
               </a:spcAft>
               <a:buNone/>
             </a:pPr>
-            <a:endParaRPr b="1"/>
+            <a:endParaRPr b="1" dirty="0"/>
           </a:p>
         </p:txBody>
       </p:sp>

</xml_diff>